<commit_message>
Feature/restructuring and expanding (#21)
* add edit on github link

* restructuring

* advanced restructuring

* add quickstart

* add overview image

* quickstart on top

* add circuit transformer

* update readme

* change image size QuAntiL Overview

* add overview description

Co-authored-by: Karoline Saatkamp <karoline.saatkamp@iaas.uni-stuttgart.de>
</commit_message>
<xml_diff>
--- a/docs/images/components.pptx
+++ b/docs/images/components.pptx
@@ -104,6 +104,11 @@
       </a:defRPr>
     </a:lvl9pPr>
   </p:defaultTextStyle>
+  <p:extLst>
+    <p:ext uri="{EFAFB233-063F-42B5-8137-9DF3F51BA10A}">
+      <p15:sldGuideLst xmlns:p15="http://schemas.microsoft.com/office/powerpoint/2012/main"/>
+    </p:ext>
+  </p:extLst>
 </p:presentation>
 </file>
 
@@ -256,7 +261,7 @@
           <a:p>
             <a:fld id="{19645D8C-4EAC-A548-94DE-127F8D402EB2}" type="datetimeFigureOut">
               <a:rPr lang="en-US" smtClean="0"/>
-              <a:t>2/17/21</a:t>
+              <a:t>2/25/21</a:t>
             </a:fld>
             <a:endParaRPr lang="en-US"/>
           </a:p>
@@ -431,7 +436,7 @@
           <a:p>
             <a:fld id="{19645D8C-4EAC-A548-94DE-127F8D402EB2}" type="datetimeFigureOut">
               <a:rPr lang="en-US" smtClean="0"/>
-              <a:t>2/17/21</a:t>
+              <a:t>2/25/21</a:t>
             </a:fld>
             <a:endParaRPr lang="en-US"/>
           </a:p>
@@ -616,7 +621,7 @@
           <a:p>
             <a:fld id="{19645D8C-4EAC-A548-94DE-127F8D402EB2}" type="datetimeFigureOut">
               <a:rPr lang="en-US" smtClean="0"/>
-              <a:t>2/17/21</a:t>
+              <a:t>2/25/21</a:t>
             </a:fld>
             <a:endParaRPr lang="en-US"/>
           </a:p>
@@ -791,7 +796,7 @@
           <a:p>
             <a:fld id="{19645D8C-4EAC-A548-94DE-127F8D402EB2}" type="datetimeFigureOut">
               <a:rPr lang="en-US" smtClean="0"/>
-              <a:t>2/17/21</a:t>
+              <a:t>2/25/21</a:t>
             </a:fld>
             <a:endParaRPr lang="en-US"/>
           </a:p>
@@ -1071,7 +1076,7 @@
           <a:p>
             <a:fld id="{19645D8C-4EAC-A548-94DE-127F8D402EB2}" type="datetimeFigureOut">
               <a:rPr lang="en-US" smtClean="0"/>
-              <a:t>2/17/21</a:t>
+              <a:t>2/25/21</a:t>
             </a:fld>
             <a:endParaRPr lang="en-US"/>
           </a:p>
@@ -1289,7 +1294,7 @@
           <a:p>
             <a:fld id="{19645D8C-4EAC-A548-94DE-127F8D402EB2}" type="datetimeFigureOut">
               <a:rPr lang="en-US" smtClean="0"/>
-              <a:t>2/17/21</a:t>
+              <a:t>2/25/21</a:t>
             </a:fld>
             <a:endParaRPr lang="en-US"/>
           </a:p>
@@ -1662,7 +1667,7 @@
           <a:p>
             <a:fld id="{19645D8C-4EAC-A548-94DE-127F8D402EB2}" type="datetimeFigureOut">
               <a:rPr lang="en-US" smtClean="0"/>
-              <a:t>2/17/21</a:t>
+              <a:t>2/25/21</a:t>
             </a:fld>
             <a:endParaRPr lang="en-US"/>
           </a:p>
@@ -1804,7 +1809,7 @@
           <a:p>
             <a:fld id="{19645D8C-4EAC-A548-94DE-127F8D402EB2}" type="datetimeFigureOut">
               <a:rPr lang="en-US" smtClean="0"/>
-              <a:t>2/17/21</a:t>
+              <a:t>2/25/21</a:t>
             </a:fld>
             <a:endParaRPr lang="en-US"/>
           </a:p>
@@ -1917,7 +1922,7 @@
           <a:p>
             <a:fld id="{19645D8C-4EAC-A548-94DE-127F8D402EB2}" type="datetimeFigureOut">
               <a:rPr lang="en-US" smtClean="0"/>
-              <a:t>2/17/21</a:t>
+              <a:t>2/25/21</a:t>
             </a:fld>
             <a:endParaRPr lang="en-US"/>
           </a:p>
@@ -2209,7 +2214,7 @@
           <a:p>
             <a:fld id="{19645D8C-4EAC-A548-94DE-127F8D402EB2}" type="datetimeFigureOut">
               <a:rPr lang="en-US" smtClean="0"/>
-              <a:t>2/17/21</a:t>
+              <a:t>2/25/21</a:t>
             </a:fld>
             <a:endParaRPr lang="en-US"/>
           </a:p>
@@ -2502,7 +2507,7 @@
           <a:p>
             <a:fld id="{19645D8C-4EAC-A548-94DE-127F8D402EB2}" type="datetimeFigureOut">
               <a:rPr lang="en-US" smtClean="0"/>
-              <a:t>2/17/21</a:t>
+              <a:t>2/25/21</a:t>
             </a:fld>
             <a:endParaRPr lang="en-US"/>
           </a:p>
@@ -2720,7 +2725,7 @@
           <a:p>
             <a:fld id="{19645D8C-4EAC-A548-94DE-127F8D402EB2}" type="datetimeFigureOut">
               <a:rPr lang="en-US" smtClean="0"/>
-              <a:t>2/17/21</a:t>
+              <a:t>2/25/21</a:t>
             </a:fld>
             <a:endParaRPr lang="en-US"/>
           </a:p>
@@ -3294,7 +3299,7 @@
         <p:grpSpPr>
           <a:xfrm>
             <a:off x="47163" y="1489468"/>
-            <a:ext cx="10189523" cy="626882"/>
+            <a:ext cx="11948619" cy="626882"/>
             <a:chOff x="2974656" y="3109269"/>
             <a:chExt cx="2032657" cy="626882"/>
           </a:xfrm>
@@ -4715,7 +4720,7 @@
         </p:nvGrpSpPr>
         <p:grpSpPr>
           <a:xfrm>
-            <a:off x="5999311" y="3076309"/>
+            <a:off x="7927690" y="3076309"/>
             <a:ext cx="2003162" cy="1327775"/>
             <a:chOff x="2974656" y="2959163"/>
             <a:chExt cx="2032657" cy="776988"/>
@@ -4857,7 +4862,7 @@
         </p:nvGrpSpPr>
         <p:grpSpPr>
           <a:xfrm>
-            <a:off x="6101717" y="4164226"/>
+            <a:off x="8030096" y="4164226"/>
             <a:ext cx="1807161" cy="796371"/>
             <a:chOff x="2593854" y="4310634"/>
             <a:chExt cx="2039796" cy="917663"/>
@@ -5123,7 +5128,7 @@
         </p:nvGrpSpPr>
         <p:grpSpPr>
           <a:xfrm>
-            <a:off x="8233523" y="3076309"/>
+            <a:off x="9992620" y="3076305"/>
             <a:ext cx="2003162" cy="1327775"/>
             <a:chOff x="2974656" y="2959163"/>
             <a:chExt cx="2032657" cy="776988"/>
@@ -5161,6 +5166,7 @@
               <a:solidFill>
                 <a:schemeClr val="tx1"/>
               </a:solidFill>
+              <a:prstDash val="sysDash"/>
             </a:ln>
           </p:spPr>
           <p:style>
@@ -5231,7 +5237,7 @@
                     </a:schemeClr>
                   </a:solidFill>
                 </a:rPr>
-                <a:t>Pattern Atlas</a:t>
+                <a:t>PatternAtlas</a:t>
               </a:r>
             </a:p>
             <a:p>
@@ -5265,7 +5271,7 @@
         </p:nvGrpSpPr>
         <p:grpSpPr>
           <a:xfrm>
-            <a:off x="8335929" y="4164226"/>
+            <a:off x="10095026" y="4164222"/>
             <a:ext cx="1807161" cy="796371"/>
             <a:chOff x="2593854" y="4310634"/>
             <a:chExt cx="2039796" cy="917663"/>
@@ -5306,6 +5312,7 @@
                   <a:lumOff val="5000"/>
                 </a:schemeClr>
               </a:solidFill>
+              <a:prstDash val="sysDash"/>
             </a:ln>
           </p:spPr>
           <p:style>
@@ -5833,7 +5840,7 @@
         </p:nvGrpSpPr>
         <p:grpSpPr>
           <a:xfrm>
-            <a:off x="6256161" y="2959344"/>
+            <a:off x="8184540" y="2959344"/>
             <a:ext cx="1499699" cy="340519"/>
             <a:chOff x="2974656" y="2949166"/>
             <a:chExt cx="2032657" cy="826642"/>
@@ -5961,7 +5968,7 @@
         </p:nvGrpSpPr>
         <p:grpSpPr>
           <a:xfrm>
-            <a:off x="8481570" y="2944157"/>
+            <a:off x="10240667" y="2944153"/>
             <a:ext cx="1499699" cy="340519"/>
             <a:chOff x="2974656" y="2949166"/>
             <a:chExt cx="2032657" cy="826642"/>
@@ -6434,7 +6441,7 @@
         </p:nvCxnSpPr>
         <p:spPr>
           <a:xfrm>
-            <a:off x="7000890" y="2131970"/>
+            <a:off x="8929269" y="2131970"/>
             <a:ext cx="0" cy="827368"/>
           </a:xfrm>
           <a:prstGeom prst="straightConnector1">
@@ -6480,7 +6487,7 @@
         </p:nvCxnSpPr>
         <p:spPr>
           <a:xfrm>
-            <a:off x="9218162" y="2125611"/>
+            <a:off x="10977259" y="2125607"/>
             <a:ext cx="0" cy="818540"/>
           </a:xfrm>
           <a:prstGeom prst="straightConnector1">
@@ -6491,6 +6498,574 @@
               <a:schemeClr val="tx1"/>
             </a:solidFill>
             <a:headEnd type="none" w="lg" len="med"/>
+            <a:tailEnd type="triangle" w="lg" len="med"/>
+          </a:ln>
+        </p:spPr>
+        <p:style>
+          <a:lnRef idx="1">
+            <a:schemeClr val="accent1"/>
+          </a:lnRef>
+          <a:fillRef idx="0">
+            <a:schemeClr val="accent1"/>
+          </a:fillRef>
+          <a:effectRef idx="0">
+            <a:schemeClr val="accent1"/>
+          </a:effectRef>
+          <a:fontRef idx="minor">
+            <a:schemeClr val="tx1"/>
+          </a:fontRef>
+        </p:style>
+      </p:cxnSp>
+      <p:grpSp>
+        <p:nvGrpSpPr>
+          <p:cNvPr id="93" name="Gruppieren 92">
+            <a:extLst>
+              <a:ext uri="{FF2B5EF4-FFF2-40B4-BE49-F238E27FC236}">
+                <a16:creationId xmlns:a16="http://schemas.microsoft.com/office/drawing/2014/main" id="{5C42A964-9B10-B64B-A983-34D0E8935F3F}"/>
+              </a:ext>
+            </a:extLst>
+          </p:cNvPr>
+          <p:cNvGrpSpPr/>
+          <p:nvPr/>
+        </p:nvGrpSpPr>
+        <p:grpSpPr>
+          <a:xfrm>
+            <a:off x="5699268" y="3071326"/>
+            <a:ext cx="2296340" cy="1327775"/>
+            <a:chOff x="2825909" y="2959163"/>
+            <a:chExt cx="2330152" cy="776988"/>
+          </a:xfrm>
+          <a:solidFill>
+            <a:schemeClr val="bg1">
+              <a:lumMod val="95000"/>
+            </a:schemeClr>
+          </a:solidFill>
+        </p:grpSpPr>
+        <p:sp>
+          <p:nvSpPr>
+            <p:cNvPr id="94" name="Abgerundetes Rechteck 93">
+              <a:extLst>
+                <a:ext uri="{FF2B5EF4-FFF2-40B4-BE49-F238E27FC236}">
+                  <a16:creationId xmlns:a16="http://schemas.microsoft.com/office/drawing/2014/main" id="{ECA236C0-1A62-5C45-9423-B86A650FC8EF}"/>
+                </a:ext>
+              </a:extLst>
+            </p:cNvPr>
+            <p:cNvSpPr/>
+            <p:nvPr/>
+          </p:nvSpPr>
+          <p:spPr>
+            <a:xfrm>
+              <a:off x="2974656" y="2959163"/>
+              <a:ext cx="2032657" cy="776988"/>
+            </a:xfrm>
+            <a:prstGeom prst="roundRect">
+              <a:avLst>
+                <a:gd name="adj" fmla="val 4496"/>
+              </a:avLst>
+            </a:prstGeom>
+            <a:grpFill/>
+            <a:ln w="19050">
+              <a:solidFill>
+                <a:schemeClr val="tx1"/>
+              </a:solidFill>
+            </a:ln>
+          </p:spPr>
+          <p:style>
+            <a:lnRef idx="2">
+              <a:schemeClr val="accent1">
+                <a:shade val="50000"/>
+              </a:schemeClr>
+            </a:lnRef>
+            <a:fillRef idx="1">
+              <a:schemeClr val="accent1"/>
+            </a:fillRef>
+            <a:effectRef idx="0">
+              <a:schemeClr val="accent1"/>
+            </a:effectRef>
+            <a:fontRef idx="minor">
+              <a:schemeClr val="lt1"/>
+            </a:fontRef>
+          </p:style>
+          <p:txBody>
+            <a:bodyPr rot="0" spcFirstLastPara="0" vertOverflow="overflow" horzOverflow="overflow" vert="horz" wrap="square" lIns="91440" tIns="45720" rIns="91440" bIns="45720" numCol="1" spcCol="0" rtlCol="0" fromWordArt="0" anchor="ctr" anchorCtr="0" forceAA="0" compatLnSpc="1">
+              <a:prstTxWarp prst="textNoShape">
+                <a:avLst/>
+              </a:prstTxWarp>
+              <a:noAutofit/>
+            </a:bodyPr>
+            <a:lstStyle/>
+            <a:p>
+              <a:pPr algn="ctr"/>
+              <a:endParaRPr lang="en-US"/>
+            </a:p>
+          </p:txBody>
+        </p:sp>
+        <p:sp>
+          <p:nvSpPr>
+            <p:cNvPr id="101" name="Textfeld 100">
+              <a:extLst>
+                <a:ext uri="{FF2B5EF4-FFF2-40B4-BE49-F238E27FC236}">
+                  <a16:creationId xmlns:a16="http://schemas.microsoft.com/office/drawing/2014/main" id="{5AC3C5DB-AB01-5640-94E2-D4F3A4A341AE}"/>
+                </a:ext>
+              </a:extLst>
+            </p:cNvPr>
+            <p:cNvSpPr txBox="1"/>
+            <p:nvPr/>
+          </p:nvSpPr>
+          <p:spPr>
+            <a:xfrm>
+              <a:off x="2825909" y="3170709"/>
+              <a:ext cx="2330152" cy="358677"/>
+            </a:xfrm>
+            <a:prstGeom prst="roundRect">
+              <a:avLst/>
+            </a:prstGeom>
+            <a:noFill/>
+          </p:spPr>
+          <p:txBody>
+            <a:bodyPr wrap="square" rtlCol="0">
+              <a:spAutoFit/>
+            </a:bodyPr>
+            <a:lstStyle/>
+            <a:p>
+              <a:pPr algn="ctr"/>
+              <a:r>
+                <a:rPr lang="en-US" noProof="1">
+                  <a:solidFill>
+                    <a:schemeClr val="tx1">
+                      <a:lumMod val="95000"/>
+                      <a:lumOff val="5000"/>
+                    </a:schemeClr>
+                  </a:solidFill>
+                </a:rPr>
+                <a:t>Circuit Transformer</a:t>
+              </a:r>
+            </a:p>
+            <a:p>
+              <a:pPr algn="ctr"/>
+              <a:r>
+                <a:rPr lang="en-US" sz="1200" noProof="1">
+                  <a:solidFill>
+                    <a:schemeClr val="tx1">
+                      <a:lumMod val="95000"/>
+                      <a:lumOff val="5000"/>
+                    </a:schemeClr>
+                  </a:solidFill>
+                </a:rPr>
+                <a:t>Flask</a:t>
+              </a:r>
+            </a:p>
+          </p:txBody>
+        </p:sp>
+      </p:grpSp>
+      <p:grpSp>
+        <p:nvGrpSpPr>
+          <p:cNvPr id="102" name="Gruppieren 101">
+            <a:extLst>
+              <a:ext uri="{FF2B5EF4-FFF2-40B4-BE49-F238E27FC236}">
+                <a16:creationId xmlns:a16="http://schemas.microsoft.com/office/drawing/2014/main" id="{53A1400F-6F19-1845-990A-9327873E8115}"/>
+              </a:ext>
+            </a:extLst>
+          </p:cNvPr>
+          <p:cNvGrpSpPr/>
+          <p:nvPr/>
+        </p:nvGrpSpPr>
+        <p:grpSpPr>
+          <a:xfrm>
+            <a:off x="5948263" y="4159243"/>
+            <a:ext cx="1807161" cy="796371"/>
+            <a:chOff x="2593854" y="4310634"/>
+            <a:chExt cx="2039796" cy="917663"/>
+          </a:xfrm>
+          <a:solidFill>
+            <a:schemeClr val="bg1">
+              <a:lumMod val="75000"/>
+            </a:schemeClr>
+          </a:solidFill>
+        </p:grpSpPr>
+        <p:sp>
+          <p:nvSpPr>
+            <p:cNvPr id="103" name="Zylinder 102">
+              <a:extLst>
+                <a:ext uri="{FF2B5EF4-FFF2-40B4-BE49-F238E27FC236}">
+                  <a16:creationId xmlns:a16="http://schemas.microsoft.com/office/drawing/2014/main" id="{E5290692-8A32-FA48-8769-CC1521AA8E2F}"/>
+                </a:ext>
+              </a:extLst>
+            </p:cNvPr>
+            <p:cNvSpPr/>
+            <p:nvPr/>
+          </p:nvSpPr>
+          <p:spPr>
+            <a:xfrm>
+              <a:off x="2593854" y="4310634"/>
+              <a:ext cx="2039796" cy="917663"/>
+            </a:xfrm>
+            <a:prstGeom prst="can">
+              <a:avLst>
+                <a:gd name="adj" fmla="val 21079"/>
+              </a:avLst>
+            </a:prstGeom>
+            <a:grpFill/>
+            <a:ln w="19050">
+              <a:solidFill>
+                <a:schemeClr val="tx1">
+                  <a:lumMod val="95000"/>
+                  <a:lumOff val="5000"/>
+                </a:schemeClr>
+              </a:solidFill>
+            </a:ln>
+          </p:spPr>
+          <p:style>
+            <a:lnRef idx="2">
+              <a:schemeClr val="accent1">
+                <a:shade val="50000"/>
+              </a:schemeClr>
+            </a:lnRef>
+            <a:fillRef idx="1">
+              <a:schemeClr val="accent1"/>
+            </a:fillRef>
+            <a:effectRef idx="0">
+              <a:schemeClr val="accent1"/>
+            </a:effectRef>
+            <a:fontRef idx="minor">
+              <a:schemeClr val="lt1"/>
+            </a:fontRef>
+          </p:style>
+          <p:txBody>
+            <a:bodyPr rtlCol="0" anchor="ctr"/>
+            <a:lstStyle/>
+            <a:p>
+              <a:pPr algn="ctr"/>
+              <a:endParaRPr lang="en-US" sz="800" noProof="1">
+                <a:solidFill>
+                  <a:schemeClr val="tx2">
+                    <a:lumMod val="50000"/>
+                  </a:schemeClr>
+                </a:solidFill>
+              </a:endParaRPr>
+            </a:p>
+            <a:p>
+              <a:pPr algn="ctr"/>
+              <a:endParaRPr lang="en-US" sz="800" noProof="1">
+                <a:solidFill>
+                  <a:schemeClr val="tx2">
+                    <a:lumMod val="50000"/>
+                  </a:schemeClr>
+                </a:solidFill>
+              </a:endParaRPr>
+            </a:p>
+            <a:p>
+              <a:pPr algn="ctr"/>
+              <a:endParaRPr lang="en-US" sz="800" noProof="1">
+                <a:solidFill>
+                  <a:schemeClr val="tx2">
+                    <a:lumMod val="50000"/>
+                  </a:schemeClr>
+                </a:solidFill>
+              </a:endParaRPr>
+            </a:p>
+            <a:p>
+              <a:pPr algn="ctr"/>
+              <a:endParaRPr lang="en-US" sz="800" noProof="1">
+                <a:solidFill>
+                  <a:schemeClr val="tx2">
+                    <a:lumMod val="50000"/>
+                  </a:schemeClr>
+                </a:solidFill>
+              </a:endParaRPr>
+            </a:p>
+            <a:p>
+              <a:pPr algn="ctr"/>
+              <a:endParaRPr lang="en-US" sz="800" noProof="1">
+                <a:solidFill>
+                  <a:schemeClr val="tx2">
+                    <a:lumMod val="50000"/>
+                  </a:schemeClr>
+                </a:solidFill>
+              </a:endParaRPr>
+            </a:p>
+            <a:p>
+              <a:pPr algn="ctr"/>
+              <a:endParaRPr lang="en-US" sz="800" noProof="1">
+                <a:solidFill>
+                  <a:schemeClr val="tx2">
+                    <a:lumMod val="50000"/>
+                  </a:schemeClr>
+                </a:solidFill>
+              </a:endParaRPr>
+            </a:p>
+            <a:p>
+              <a:pPr algn="ctr"/>
+              <a:endParaRPr lang="en-US" sz="800" noProof="1">
+                <a:solidFill>
+                  <a:schemeClr val="tx2">
+                    <a:lumMod val="50000"/>
+                  </a:schemeClr>
+                </a:solidFill>
+              </a:endParaRPr>
+            </a:p>
+            <a:p>
+              <a:pPr algn="ctr"/>
+              <a:endParaRPr lang="en-US" sz="800" noProof="1">
+                <a:solidFill>
+                  <a:schemeClr val="tx2">
+                    <a:lumMod val="50000"/>
+                  </a:schemeClr>
+                </a:solidFill>
+              </a:endParaRPr>
+            </a:p>
+            <a:p>
+              <a:pPr algn="ctr"/>
+              <a:endParaRPr lang="en-US" sz="800" noProof="1">
+                <a:solidFill>
+                  <a:schemeClr val="tx2">
+                    <a:lumMod val="50000"/>
+                  </a:schemeClr>
+                </a:solidFill>
+              </a:endParaRPr>
+            </a:p>
+            <a:p>
+              <a:pPr algn="ctr"/>
+              <a:endParaRPr lang="en-US" sz="800" noProof="1">
+                <a:solidFill>
+                  <a:schemeClr val="tx2">
+                    <a:lumMod val="50000"/>
+                  </a:schemeClr>
+                </a:solidFill>
+              </a:endParaRPr>
+            </a:p>
+            <a:p>
+              <a:pPr algn="ctr"/>
+              <a:endParaRPr lang="en-US" sz="800" noProof="1">
+                <a:solidFill>
+                  <a:schemeClr val="tx2">
+                    <a:lumMod val="50000"/>
+                  </a:schemeClr>
+                </a:solidFill>
+              </a:endParaRPr>
+            </a:p>
+            <a:p>
+              <a:pPr algn="ctr"/>
+              <a:endParaRPr lang="en-US" sz="800" noProof="1">
+                <a:solidFill>
+                  <a:schemeClr val="tx2">
+                    <a:lumMod val="50000"/>
+                  </a:schemeClr>
+                </a:solidFill>
+              </a:endParaRPr>
+            </a:p>
+            <a:p>
+              <a:pPr algn="ctr"/>
+              <a:endParaRPr lang="en-US" sz="800" noProof="1">
+                <a:solidFill>
+                  <a:schemeClr val="tx2">
+                    <a:lumMod val="50000"/>
+                  </a:schemeClr>
+                </a:solidFill>
+              </a:endParaRPr>
+            </a:p>
+          </p:txBody>
+        </p:sp>
+        <p:sp>
+          <p:nvSpPr>
+            <p:cNvPr id="110" name="Textfeld 109">
+              <a:extLst>
+                <a:ext uri="{FF2B5EF4-FFF2-40B4-BE49-F238E27FC236}">
+                  <a16:creationId xmlns:a16="http://schemas.microsoft.com/office/drawing/2014/main" id="{F18D1183-01D0-034B-8DE8-D26F1F82BF13}"/>
+                </a:ext>
+              </a:extLst>
+            </p:cNvPr>
+            <p:cNvSpPr txBox="1"/>
+            <p:nvPr/>
+          </p:nvSpPr>
+          <p:spPr>
+            <a:xfrm>
+              <a:off x="2656536" y="4587024"/>
+              <a:ext cx="1954191" cy="470859"/>
+            </a:xfrm>
+            <a:prstGeom prst="roundRect">
+              <a:avLst/>
+            </a:prstGeom>
+            <a:noFill/>
+          </p:spPr>
+          <p:txBody>
+            <a:bodyPr wrap="square" rtlCol="0">
+              <a:spAutoFit/>
+            </a:bodyPr>
+            <a:lstStyle/>
+            <a:p>
+              <a:pPr algn="ctr"/>
+              <a:r>
+                <a:rPr lang="en-US" noProof="1">
+                  <a:solidFill>
+                    <a:schemeClr val="tx1">
+                      <a:lumMod val="95000"/>
+                      <a:lumOff val="5000"/>
+                    </a:schemeClr>
+                  </a:solidFill>
+                </a:rPr>
+                <a:t>Gate Mappings</a:t>
+              </a:r>
+            </a:p>
+          </p:txBody>
+        </p:sp>
+      </p:grpSp>
+      <p:grpSp>
+        <p:nvGrpSpPr>
+          <p:cNvPr id="112" name="Gruppieren 111">
+            <a:extLst>
+              <a:ext uri="{FF2B5EF4-FFF2-40B4-BE49-F238E27FC236}">
+                <a16:creationId xmlns:a16="http://schemas.microsoft.com/office/drawing/2014/main" id="{0E836C74-D107-ED40-9DC0-70E2E5BE865A}"/>
+              </a:ext>
+            </a:extLst>
+          </p:cNvPr>
+          <p:cNvGrpSpPr/>
+          <p:nvPr/>
+        </p:nvGrpSpPr>
+        <p:grpSpPr>
+          <a:xfrm>
+            <a:off x="6119608" y="2945281"/>
+            <a:ext cx="1499699" cy="340519"/>
+            <a:chOff x="2974656" y="2949166"/>
+            <a:chExt cx="2032657" cy="826642"/>
+          </a:xfrm>
+          <a:solidFill>
+            <a:schemeClr val="bg1">
+              <a:lumMod val="85000"/>
+            </a:schemeClr>
+          </a:solidFill>
+        </p:grpSpPr>
+        <p:sp>
+          <p:nvSpPr>
+            <p:cNvPr id="113" name="Abgerundetes Rechteck 112">
+              <a:extLst>
+                <a:ext uri="{FF2B5EF4-FFF2-40B4-BE49-F238E27FC236}">
+                  <a16:creationId xmlns:a16="http://schemas.microsoft.com/office/drawing/2014/main" id="{104D0B68-50AC-B443-BF26-7F7B88EC4BE4}"/>
+                </a:ext>
+              </a:extLst>
+            </p:cNvPr>
+            <p:cNvSpPr/>
+            <p:nvPr/>
+          </p:nvSpPr>
+          <p:spPr>
+            <a:xfrm>
+              <a:off x="2974656" y="2959163"/>
+              <a:ext cx="2032657" cy="776988"/>
+            </a:xfrm>
+            <a:prstGeom prst="roundRect">
+              <a:avLst>
+                <a:gd name="adj" fmla="val 4496"/>
+              </a:avLst>
+            </a:prstGeom>
+            <a:grpFill/>
+            <a:ln w="19050">
+              <a:solidFill>
+                <a:schemeClr val="tx1"/>
+              </a:solidFill>
+            </a:ln>
+          </p:spPr>
+          <p:style>
+            <a:lnRef idx="2">
+              <a:schemeClr val="accent1">
+                <a:shade val="50000"/>
+              </a:schemeClr>
+            </a:lnRef>
+            <a:fillRef idx="1">
+              <a:schemeClr val="accent1"/>
+            </a:fillRef>
+            <a:effectRef idx="0">
+              <a:schemeClr val="accent1"/>
+            </a:effectRef>
+            <a:fontRef idx="minor">
+              <a:schemeClr val="lt1"/>
+            </a:fontRef>
+          </p:style>
+          <p:txBody>
+            <a:bodyPr rot="0" spcFirstLastPara="0" vertOverflow="overflow" horzOverflow="overflow" vert="horz" wrap="square" lIns="91440" tIns="45720" rIns="91440" bIns="45720" numCol="1" spcCol="0" rtlCol="0" fromWordArt="0" anchor="ctr" anchorCtr="0" forceAA="0" compatLnSpc="1">
+              <a:prstTxWarp prst="textNoShape">
+                <a:avLst/>
+              </a:prstTxWarp>
+              <a:noAutofit/>
+            </a:bodyPr>
+            <a:lstStyle/>
+            <a:p>
+              <a:pPr algn="ctr"/>
+              <a:endParaRPr lang="en-US"/>
+            </a:p>
+          </p:txBody>
+        </p:sp>
+        <p:sp>
+          <p:nvSpPr>
+            <p:cNvPr id="115" name="Textfeld 114">
+              <a:extLst>
+                <a:ext uri="{FF2B5EF4-FFF2-40B4-BE49-F238E27FC236}">
+                  <a16:creationId xmlns:a16="http://schemas.microsoft.com/office/drawing/2014/main" id="{61BE0135-C67B-144A-AF4F-A5A3E76C0810}"/>
+                </a:ext>
+              </a:extLst>
+            </p:cNvPr>
+            <p:cNvSpPr txBox="1"/>
+            <p:nvPr/>
+          </p:nvSpPr>
+          <p:spPr>
+            <a:xfrm>
+              <a:off x="2997401" y="2949166"/>
+              <a:ext cx="1987165" cy="826642"/>
+            </a:xfrm>
+            <a:prstGeom prst="roundRect">
+              <a:avLst/>
+            </a:prstGeom>
+            <a:noFill/>
+          </p:spPr>
+          <p:txBody>
+            <a:bodyPr wrap="square" rtlCol="0">
+              <a:spAutoFit/>
+            </a:bodyPr>
+            <a:lstStyle/>
+            <a:p>
+              <a:pPr algn="ctr"/>
+              <a:r>
+                <a:rPr lang="en-US" sz="1400" noProof="1">
+                  <a:solidFill>
+                    <a:schemeClr val="tx1">
+                      <a:lumMod val="95000"/>
+                      <a:lumOff val="5000"/>
+                    </a:schemeClr>
+                  </a:solidFill>
+                </a:rPr>
+                <a:t>HTTP REST API</a:t>
+              </a:r>
+            </a:p>
+          </p:txBody>
+        </p:sp>
+      </p:grpSp>
+      <p:cxnSp>
+        <p:nvCxnSpPr>
+          <p:cNvPr id="116" name="Gekrümmte Verbindung 115">
+            <a:extLst>
+              <a:ext uri="{FF2B5EF4-FFF2-40B4-BE49-F238E27FC236}">
+                <a16:creationId xmlns:a16="http://schemas.microsoft.com/office/drawing/2014/main" id="{43196147-1F4F-3E4F-99FC-4B31AE71C49B}"/>
+              </a:ext>
+            </a:extLst>
+          </p:cNvPr>
+          <p:cNvCxnSpPr>
+            <a:cxnSpLocks/>
+          </p:cNvCxnSpPr>
+          <p:nvPr/>
+        </p:nvCxnSpPr>
+        <p:spPr>
+          <a:xfrm rot="5040000" flipH="1" flipV="1">
+            <a:off x="6243956" y="2419108"/>
+            <a:ext cx="2296" cy="1192952"/>
+          </a:xfrm>
+          <a:prstGeom prst="curvedConnector3">
+            <a:avLst>
+              <a:gd name="adj1" fmla="val 11600809"/>
+            </a:avLst>
+          </a:prstGeom>
+          <a:ln w="19050">
+            <a:solidFill>
+              <a:schemeClr val="tx1"/>
+            </a:solidFill>
             <a:tailEnd type="triangle" w="lg" len="med"/>
           </a:ln>
         </p:spPr>

</xml_diff>